<commit_message>
o que deu por enquanto
</commit_message>
<xml_diff>
--- a/Resources/Images/Figuras.pptx
+++ b/Resources/Images/Figuras.pptx
@@ -14,6 +14,8 @@
     <p:sldId id="262" r:id="rId8"/>
     <p:sldId id="264" r:id="rId9"/>
     <p:sldId id="263" r:id="rId10"/>
+    <p:sldId id="265" r:id="rId11"/>
+    <p:sldId id="266" r:id="rId12"/>
   </p:sldIdLst>
   <p:sldSz cx="12192000" cy="6858000"/>
   <p:notesSz cx="6858000" cy="9144000"/>
@@ -262,7 +264,7 @@
           <a:p>
             <a:fld id="{1C4A350A-2E69-4F0B-AF0D-60E80FEC2B7F}" type="datetimeFigureOut">
               <a:rPr lang="pt-BR" smtClean="0"/>
-              <a:t>29/05/2016</a:t>
+              <a:t>30/05/2016</a:t>
             </a:fld>
             <a:endParaRPr lang="pt-BR"/>
           </a:p>
@@ -432,7 +434,7 @@
           <a:p>
             <a:fld id="{1C4A350A-2E69-4F0B-AF0D-60E80FEC2B7F}" type="datetimeFigureOut">
               <a:rPr lang="pt-BR" smtClean="0"/>
-              <a:t>29/05/2016</a:t>
+              <a:t>30/05/2016</a:t>
             </a:fld>
             <a:endParaRPr lang="pt-BR"/>
           </a:p>
@@ -612,7 +614,7 @@
           <a:p>
             <a:fld id="{1C4A350A-2E69-4F0B-AF0D-60E80FEC2B7F}" type="datetimeFigureOut">
               <a:rPr lang="pt-BR" smtClean="0"/>
-              <a:t>29/05/2016</a:t>
+              <a:t>30/05/2016</a:t>
             </a:fld>
             <a:endParaRPr lang="pt-BR"/>
           </a:p>
@@ -782,7 +784,7 @@
           <a:p>
             <a:fld id="{1C4A350A-2E69-4F0B-AF0D-60E80FEC2B7F}" type="datetimeFigureOut">
               <a:rPr lang="pt-BR" smtClean="0"/>
-              <a:t>29/05/2016</a:t>
+              <a:t>30/05/2016</a:t>
             </a:fld>
             <a:endParaRPr lang="pt-BR"/>
           </a:p>
@@ -1028,7 +1030,7 @@
           <a:p>
             <a:fld id="{1C4A350A-2E69-4F0B-AF0D-60E80FEC2B7F}" type="datetimeFigureOut">
               <a:rPr lang="pt-BR" smtClean="0"/>
-              <a:t>29/05/2016</a:t>
+              <a:t>30/05/2016</a:t>
             </a:fld>
             <a:endParaRPr lang="pt-BR"/>
           </a:p>
@@ -1260,7 +1262,7 @@
           <a:p>
             <a:fld id="{1C4A350A-2E69-4F0B-AF0D-60E80FEC2B7F}" type="datetimeFigureOut">
               <a:rPr lang="pt-BR" smtClean="0"/>
-              <a:t>29/05/2016</a:t>
+              <a:t>30/05/2016</a:t>
             </a:fld>
             <a:endParaRPr lang="pt-BR"/>
           </a:p>
@@ -1627,7 +1629,7 @@
           <a:p>
             <a:fld id="{1C4A350A-2E69-4F0B-AF0D-60E80FEC2B7F}" type="datetimeFigureOut">
               <a:rPr lang="pt-BR" smtClean="0"/>
-              <a:t>29/05/2016</a:t>
+              <a:t>30/05/2016</a:t>
             </a:fld>
             <a:endParaRPr lang="pt-BR"/>
           </a:p>
@@ -1745,7 +1747,7 @@
           <a:p>
             <a:fld id="{1C4A350A-2E69-4F0B-AF0D-60E80FEC2B7F}" type="datetimeFigureOut">
               <a:rPr lang="pt-BR" smtClean="0"/>
-              <a:t>29/05/2016</a:t>
+              <a:t>30/05/2016</a:t>
             </a:fld>
             <a:endParaRPr lang="pt-BR"/>
           </a:p>
@@ -1840,7 +1842,7 @@
           <a:p>
             <a:fld id="{1C4A350A-2E69-4F0B-AF0D-60E80FEC2B7F}" type="datetimeFigureOut">
               <a:rPr lang="pt-BR" smtClean="0"/>
-              <a:t>29/05/2016</a:t>
+              <a:t>30/05/2016</a:t>
             </a:fld>
             <a:endParaRPr lang="pt-BR"/>
           </a:p>
@@ -2117,7 +2119,7 @@
           <a:p>
             <a:fld id="{1C4A350A-2E69-4F0B-AF0D-60E80FEC2B7F}" type="datetimeFigureOut">
               <a:rPr lang="pt-BR" smtClean="0"/>
-              <a:t>29/05/2016</a:t>
+              <a:t>30/05/2016</a:t>
             </a:fld>
             <a:endParaRPr lang="pt-BR"/>
           </a:p>
@@ -2370,7 +2372,7 @@
           <a:p>
             <a:fld id="{1C4A350A-2E69-4F0B-AF0D-60E80FEC2B7F}" type="datetimeFigureOut">
               <a:rPr lang="pt-BR" smtClean="0"/>
-              <a:t>29/05/2016</a:t>
+              <a:t>30/05/2016</a:t>
             </a:fld>
             <a:endParaRPr lang="pt-BR"/>
           </a:p>
@@ -2583,7 +2585,7 @@
           <a:p>
             <a:fld id="{1C4A350A-2E69-4F0B-AF0D-60E80FEC2B7F}" type="datetimeFigureOut">
               <a:rPr lang="pt-BR" smtClean="0"/>
-              <a:t>29/05/2016</a:t>
+              <a:t>30/05/2016</a:t>
             </a:fld>
             <a:endParaRPr lang="pt-BR"/>
           </a:p>
@@ -3651,6 +3653,152 @@
 </p:sld>
 </file>
 
+<file path=ppt/slides/slide10.xml><?xml version="1.0" encoding="utf-8"?>
+<p:sld xmlns:a="http://schemas.openxmlformats.org/drawingml/2006/main" xmlns:r="http://schemas.openxmlformats.org/officeDocument/2006/relationships" xmlns:p="http://schemas.openxmlformats.org/presentationml/2006/main">
+  <p:cSld>
+    <p:spTree>
+      <p:nvGrpSpPr>
+        <p:cNvPr id="1" name=""/>
+        <p:cNvGrpSpPr/>
+        <p:nvPr/>
+      </p:nvGrpSpPr>
+      <p:grpSpPr>
+        <a:xfrm>
+          <a:off x="0" y="0"/>
+          <a:ext cx="0" cy="0"/>
+          <a:chOff x="0" y="0"/>
+          <a:chExt cx="0" cy="0"/>
+        </a:xfrm>
+      </p:grpSpPr>
+      <p:pic>
+        <p:nvPicPr>
+          <p:cNvPr id="4" name="Imagem 3"/>
+          <p:cNvPicPr>
+            <a:picLocks noChangeAspect="1"/>
+          </p:cNvPicPr>
+          <p:nvPr/>
+        </p:nvPicPr>
+        <p:blipFill>
+          <a:blip r:embed="rId2"/>
+          <a:stretch>
+            <a:fillRect/>
+          </a:stretch>
+        </p:blipFill>
+        <p:spPr>
+          <a:xfrm>
+            <a:off x="758414" y="571857"/>
+            <a:ext cx="4462630" cy="2675250"/>
+          </a:xfrm>
+          <a:prstGeom prst="rect">
+            <a:avLst/>
+          </a:prstGeom>
+        </p:spPr>
+      </p:pic>
+      <p:pic>
+        <p:nvPicPr>
+          <p:cNvPr id="5" name="Imagem 4"/>
+          <p:cNvPicPr>
+            <a:picLocks noChangeAspect="1"/>
+          </p:cNvPicPr>
+          <p:nvPr/>
+        </p:nvPicPr>
+        <p:blipFill>
+          <a:blip r:embed="rId3"/>
+          <a:stretch>
+            <a:fillRect/>
+          </a:stretch>
+        </p:blipFill>
+        <p:spPr>
+          <a:xfrm>
+            <a:off x="558429" y="3733784"/>
+            <a:ext cx="5537571" cy="2079844"/>
+          </a:xfrm>
+          <a:prstGeom prst="rect">
+            <a:avLst/>
+          </a:prstGeom>
+        </p:spPr>
+      </p:pic>
+    </p:spTree>
+    <p:extLst>
+      <p:ext uri="{BB962C8B-B14F-4D97-AF65-F5344CB8AC3E}">
+        <p14:creationId xmlns:p14="http://schemas.microsoft.com/office/powerpoint/2010/main" val="4275902554"/>
+      </p:ext>
+    </p:extLst>
+  </p:cSld>
+  <p:clrMapOvr>
+    <a:masterClrMapping/>
+  </p:clrMapOvr>
+</p:sld>
+</file>
+
+<file path=ppt/slides/slide11.xml><?xml version="1.0" encoding="utf-8"?>
+<p:sld xmlns:a="http://schemas.openxmlformats.org/drawingml/2006/main" xmlns:r="http://schemas.openxmlformats.org/officeDocument/2006/relationships" xmlns:p="http://schemas.openxmlformats.org/presentationml/2006/main">
+  <p:cSld>
+    <p:spTree>
+      <p:nvGrpSpPr>
+        <p:cNvPr id="1" name=""/>
+        <p:cNvGrpSpPr/>
+        <p:nvPr/>
+      </p:nvGrpSpPr>
+      <p:grpSpPr>
+        <a:xfrm>
+          <a:off x="0" y="0"/>
+          <a:ext cx="0" cy="0"/>
+          <a:chOff x="0" y="0"/>
+          <a:chExt cx="0" cy="0"/>
+        </a:xfrm>
+      </p:grpSpPr>
+      <p:sp>
+        <p:nvSpPr>
+          <p:cNvPr id="2" name="Título 1"/>
+          <p:cNvSpPr>
+            <a:spLocks noGrp="1"/>
+          </p:cNvSpPr>
+          <p:nvPr>
+            <p:ph type="title"/>
+          </p:nvPr>
+        </p:nvSpPr>
+        <p:spPr/>
+        <p:txBody>
+          <a:bodyPr/>
+          <a:lstStyle/>
+          <a:p>
+            <a:endParaRPr lang="pt-BR"/>
+          </a:p>
+        </p:txBody>
+      </p:sp>
+      <p:sp>
+        <p:nvSpPr>
+          <p:cNvPr id="3" name="Espaço Reservado para Conteúdo 2"/>
+          <p:cNvSpPr>
+            <a:spLocks noGrp="1"/>
+          </p:cNvSpPr>
+          <p:nvPr>
+            <p:ph idx="1"/>
+          </p:nvPr>
+        </p:nvSpPr>
+        <p:spPr/>
+        <p:txBody>
+          <a:bodyPr/>
+          <a:lstStyle/>
+          <a:p>
+            <a:endParaRPr lang="pt-BR"/>
+          </a:p>
+        </p:txBody>
+      </p:sp>
+    </p:spTree>
+    <p:extLst>
+      <p:ext uri="{BB962C8B-B14F-4D97-AF65-F5344CB8AC3E}">
+        <p14:creationId xmlns:p14="http://schemas.microsoft.com/office/powerpoint/2010/main" val="1121017173"/>
+      </p:ext>
+    </p:extLst>
+  </p:cSld>
+  <p:clrMapOvr>
+    <a:masterClrMapping/>
+  </p:clrMapOvr>
+</p:sld>
+</file>
+
 <file path=ppt/slides/slide2.xml><?xml version="1.0" encoding="utf-8"?>
 <p:sld xmlns:a="http://schemas.openxmlformats.org/drawingml/2006/main" xmlns:r="http://schemas.openxmlformats.org/officeDocument/2006/relationships" xmlns:p="http://schemas.openxmlformats.org/presentationml/2006/main">
   <p:cSld>

</xml_diff>